<commit_message>
Refactor code, improve documentation in readme.md
</commit_message>
<xml_diff>
--- a/assets/slide_deck.pptx
+++ b/assets/slide_deck.pptx
@@ -5,7 +5,8 @@
     <p:sldMasterId id="2147483648" r:id="rId1"/>
   </p:sldMasterIdLst>
   <p:sldIdLst>
-    <p:sldId id="256" r:id="rId2"/>
+    <p:sldId id="257" r:id="rId2"/>
+    <p:sldId id="258" r:id="rId3"/>
   </p:sldIdLst>
   <p:sldSz cx="12192000" cy="6858000"/>
   <p:notesSz cx="6858000" cy="9144000"/>
@@ -104,6 +105,11 @@
       </a:defRPr>
     </a:lvl9pPr>
   </p:defaultTextStyle>
+  <p:extLst>
+    <p:ext uri="{EFAFB233-063F-42B5-8137-9DF3F51BA10A}">
+      <p15:sldGuideLst xmlns:p15="http://schemas.microsoft.com/office/powerpoint/2012/main"/>
+    </p:ext>
+  </p:extLst>
 </p:presentation>
 </file>
 
@@ -254,7 +260,7 @@
           <a:p>
             <a:fld id="{55D61703-6EB2-F349-A243-B67706490649}" type="datetimeFigureOut">
               <a:rPr lang="en-US" smtClean="0"/>
-              <a:t>2/9/25</a:t>
+              <a:t>4/30/25</a:t>
             </a:fld>
             <a:endParaRPr lang="en-US"/>
           </a:p>
@@ -452,7 +458,7 @@
           <a:p>
             <a:fld id="{55D61703-6EB2-F349-A243-B67706490649}" type="datetimeFigureOut">
               <a:rPr lang="en-US" smtClean="0"/>
-              <a:t>2/9/25</a:t>
+              <a:t>4/30/25</a:t>
             </a:fld>
             <a:endParaRPr lang="en-US"/>
           </a:p>
@@ -660,7 +666,7 @@
           <a:p>
             <a:fld id="{55D61703-6EB2-F349-A243-B67706490649}" type="datetimeFigureOut">
               <a:rPr lang="en-US" smtClean="0"/>
-              <a:t>2/9/25</a:t>
+              <a:t>4/30/25</a:t>
             </a:fld>
             <a:endParaRPr lang="en-US"/>
           </a:p>
@@ -858,7 +864,7 @@
           <a:p>
             <a:fld id="{55D61703-6EB2-F349-A243-B67706490649}" type="datetimeFigureOut">
               <a:rPr lang="en-US" smtClean="0"/>
-              <a:t>2/9/25</a:t>
+              <a:t>4/30/25</a:t>
             </a:fld>
             <a:endParaRPr lang="en-US"/>
           </a:p>
@@ -1133,7 +1139,7 @@
           <a:p>
             <a:fld id="{55D61703-6EB2-F349-A243-B67706490649}" type="datetimeFigureOut">
               <a:rPr lang="en-US" smtClean="0"/>
-              <a:t>2/9/25</a:t>
+              <a:t>4/30/25</a:t>
             </a:fld>
             <a:endParaRPr lang="en-US"/>
           </a:p>
@@ -1398,7 +1404,7 @@
           <a:p>
             <a:fld id="{55D61703-6EB2-F349-A243-B67706490649}" type="datetimeFigureOut">
               <a:rPr lang="en-US" smtClean="0"/>
-              <a:t>2/9/25</a:t>
+              <a:t>4/30/25</a:t>
             </a:fld>
             <a:endParaRPr lang="en-US"/>
           </a:p>
@@ -1810,7 +1816,7 @@
           <a:p>
             <a:fld id="{55D61703-6EB2-F349-A243-B67706490649}" type="datetimeFigureOut">
               <a:rPr lang="en-US" smtClean="0"/>
-              <a:t>2/9/25</a:t>
+              <a:t>4/30/25</a:t>
             </a:fld>
             <a:endParaRPr lang="en-US"/>
           </a:p>
@@ -1951,7 +1957,7 @@
           <a:p>
             <a:fld id="{55D61703-6EB2-F349-A243-B67706490649}" type="datetimeFigureOut">
               <a:rPr lang="en-US" smtClean="0"/>
-              <a:t>2/9/25</a:t>
+              <a:t>4/30/25</a:t>
             </a:fld>
             <a:endParaRPr lang="en-US"/>
           </a:p>
@@ -2064,7 +2070,7 @@
           <a:p>
             <a:fld id="{55D61703-6EB2-F349-A243-B67706490649}" type="datetimeFigureOut">
               <a:rPr lang="en-US" smtClean="0"/>
-              <a:t>2/9/25</a:t>
+              <a:t>4/30/25</a:t>
             </a:fld>
             <a:endParaRPr lang="en-US"/>
           </a:p>
@@ -2375,7 +2381,7 @@
           <a:p>
             <a:fld id="{55D61703-6EB2-F349-A243-B67706490649}" type="datetimeFigureOut">
               <a:rPr lang="en-US" smtClean="0"/>
-              <a:t>2/9/25</a:t>
+              <a:t>4/30/25</a:t>
             </a:fld>
             <a:endParaRPr lang="en-US"/>
           </a:p>
@@ -2663,7 +2669,7 @@
           <a:p>
             <a:fld id="{55D61703-6EB2-F349-A243-B67706490649}" type="datetimeFigureOut">
               <a:rPr lang="en-US" smtClean="0"/>
-              <a:t>2/9/25</a:t>
+              <a:t>4/30/25</a:t>
             </a:fld>
             <a:endParaRPr lang="en-US"/>
           </a:p>
@@ -2904,7 +2910,7 @@
           <a:p>
             <a:fld id="{55D61703-6EB2-F349-A243-B67706490649}" type="datetimeFigureOut">
               <a:rPr lang="en-US" smtClean="0"/>
-              <a:t>2/9/25</a:t>
+              <a:t>4/30/25</a:t>
             </a:fld>
             <a:endParaRPr lang="en-US"/>
           </a:p>
@@ -3323,10 +3329,10 @@
       </p:grpSpPr>
       <p:pic>
         <p:nvPicPr>
-          <p:cNvPr id="4" name="Picture 3">
-            <a:extLst>
-              <a:ext uri="{FF2B5EF4-FFF2-40B4-BE49-F238E27FC236}">
-                <a16:creationId xmlns:a16="http://schemas.microsoft.com/office/drawing/2014/main" id="{E2E8BAF1-48B0-BF66-6AB9-B11AAD7E3869}"/>
+          <p:cNvPr id="8" name="Picture 7" descr="A rainbow colored brain with a prism coming out of it&#10;&#10;AI-generated content may be incorrect.">
+            <a:extLst>
+              <a:ext uri="{FF2B5EF4-FFF2-40B4-BE49-F238E27FC236}">
+                <a16:creationId xmlns:a16="http://schemas.microsoft.com/office/drawing/2014/main" id="{BC0ECD84-6B1D-13DF-279F-0CF2558A6535}"/>
               </a:ext>
             </a:extLst>
           </p:cNvPr>
@@ -3335,29 +3341,15 @@
           </p:cNvPicPr>
           <p:nvPr/>
         </p:nvPicPr>
-        <p:blipFill rotWithShape="1">
-          <a:blip r:embed="rId2">
-            <a:extLst>
-              <a:ext uri="{BEBA8EAE-BF5A-486C-A8C5-ECC9F3942E4B}">
-                <a14:imgProps xmlns:a14="http://schemas.microsoft.com/office/drawing/2010/main">
-                  <a14:imgLayer r:embed="rId3">
-                    <a14:imgEffect>
-                      <a14:backgroundRemoval t="9974" b="93606" l="9982" r="89929">
-                        <a14:foregroundMark x1="59626" y1="93223" x2="58824" y2="93606"/>
-                      </a14:backgroundRemoval>
-                    </a14:imgEffect>
-                  </a14:imgLayer>
-                </a14:imgProps>
-              </a:ext>
-            </a:extLst>
-          </a:blip>
-          <a:srcRect l="12742" t="19569" r="11924" b="2356"/>
+        <p:blipFill>
+          <a:blip r:embed="rId2"/>
+          <a:srcRect b="8927"/>
           <a:stretch/>
         </p:blipFill>
         <p:spPr>
           <a:xfrm>
-            <a:off x="2138346" y="2203739"/>
-            <a:ext cx="2779188" cy="2007478"/>
+            <a:off x="5284432" y="448731"/>
+            <a:ext cx="6502400" cy="5921917"/>
           </a:xfrm>
           <a:prstGeom prst="rect">
             <a:avLst/>
@@ -3366,10 +3358,10 @@
       </p:pic>
       <p:sp>
         <p:nvSpPr>
-          <p:cNvPr id="5" name="TextBox 4">
-            <a:extLst>
-              <a:ext uri="{FF2B5EF4-FFF2-40B4-BE49-F238E27FC236}">
-                <a16:creationId xmlns:a16="http://schemas.microsoft.com/office/drawing/2014/main" id="{A53DFA06-96E0-0FFE-F553-A81F18BE2D27}"/>
+          <p:cNvPr id="6" name="TextBox 5">
+            <a:extLst>
+              <a:ext uri="{FF2B5EF4-FFF2-40B4-BE49-F238E27FC236}">
+                <a16:creationId xmlns:a16="http://schemas.microsoft.com/office/drawing/2014/main" id="{D8D08281-6F73-1087-7B61-794B516FFD99}"/>
               </a:ext>
             </a:extLst>
           </p:cNvPr>
@@ -3378,8 +3370,8 @@
         </p:nvSpPr>
         <p:spPr>
           <a:xfrm>
-            <a:off x="4381178" y="2203739"/>
-            <a:ext cx="3152231" cy="1400383"/>
+            <a:off x="5284433" y="646193"/>
+            <a:ext cx="6502400" cy="1323439"/>
           </a:xfrm>
           <a:prstGeom prst="rect">
             <a:avLst/>
@@ -3394,25 +3386,23 @@
           <a:p>
             <a:pPr algn="ctr"/>
             <a:r>
-              <a:rPr lang="en-US" sz="8500" dirty="0">
+              <a:rPr lang="en-US" sz="8000" dirty="0">
                 <a:solidFill>
-                  <a:schemeClr val="bg1">
-                    <a:lumMod val="50000"/>
-                  </a:schemeClr>
+                  <a:schemeClr val="bg2"/>
                 </a:solidFill>
                 <a:latin typeface="Helvetica" pitchFamily="2" charset="0"/>
               </a:rPr>
-              <a:t>PSTN</a:t>
-            </a:r>
-          </a:p>
-        </p:txBody>
-      </p:sp>
-      <p:sp>
-        <p:nvSpPr>
-          <p:cNvPr id="6" name="TextBox 5">
-            <a:extLst>
-              <a:ext uri="{FF2B5EF4-FFF2-40B4-BE49-F238E27FC236}">
-                <a16:creationId xmlns:a16="http://schemas.microsoft.com/office/drawing/2014/main" id="{1794D550-C820-BD0C-86D0-79441CA300C8}"/>
+              <a:t>PRISM</a:t>
+            </a:r>
+          </a:p>
+        </p:txBody>
+      </p:sp>
+      <p:sp>
+        <p:nvSpPr>
+          <p:cNvPr id="10" name="TextBox 9">
+            <a:extLst>
+              <a:ext uri="{FF2B5EF4-FFF2-40B4-BE49-F238E27FC236}">
+                <a16:creationId xmlns:a16="http://schemas.microsoft.com/office/drawing/2014/main" id="{22BD8887-A936-461F-B701-ECCDA8A9CC7E}"/>
               </a:ext>
             </a:extLst>
           </p:cNvPr>
@@ -3421,8 +3411,8 @@
         </p:nvSpPr>
         <p:spPr>
           <a:xfrm>
-            <a:off x="4518453" y="3503054"/>
-            <a:ext cx="3014956" cy="646331"/>
+            <a:off x="5284432" y="5549009"/>
+            <a:ext cx="6502400" cy="461665"/>
           </a:xfrm>
           <a:prstGeom prst="rect">
             <a:avLst/>
@@ -3435,16 +3425,24 @@
           </a:bodyPr>
           <a:lstStyle/>
           <a:p>
-            <a:r>
-              <a:rPr lang="en-US" dirty="0">
+            <a:pPr algn="ctr"/>
+            <a:r>
+              <a:rPr lang="en-US" sz="2400" dirty="0" err="1">
                 <a:solidFill>
-                  <a:schemeClr val="bg1">
-                    <a:lumMod val="50000"/>
-                  </a:schemeClr>
+                  <a:schemeClr val="bg2"/>
                 </a:solidFill>
                 <a:latin typeface="Helvetica" pitchFamily="2" charset="0"/>
               </a:rPr>
-              <a:t>Permutational Statistical Toolbox for Neuroimaging</a:t>
+              <a:t>PeRmutation</a:t>
+            </a:r>
+            <a:r>
+              <a:rPr lang="en-US" sz="2400" dirty="0">
+                <a:solidFill>
+                  <a:schemeClr val="bg2"/>
+                </a:solidFill>
+                <a:latin typeface="Helvetica" pitchFamily="2" charset="0"/>
+              </a:rPr>
+              <a:t> Inference for Statistical Mapping</a:t>
             </a:r>
           </a:p>
         </p:txBody>
@@ -3452,7 +3450,87 @@
     </p:spTree>
     <p:extLst>
       <p:ext uri="{BB962C8B-B14F-4D97-AF65-F5344CB8AC3E}">
-        <p14:creationId xmlns:p14="http://schemas.microsoft.com/office/powerpoint/2010/main" val="1072034933"/>
+        <p14:creationId xmlns:p14="http://schemas.microsoft.com/office/powerpoint/2010/main" val="2567557650"/>
+      </p:ext>
+    </p:extLst>
+  </p:cSld>
+  <p:clrMapOvr>
+    <a:masterClrMapping/>
+  </p:clrMapOvr>
+</p:sld>
+</file>
+
+<file path=ppt/slides/slide2.xml><?xml version="1.0" encoding="utf-8"?>
+<p:sld xmlns:a="http://schemas.openxmlformats.org/drawingml/2006/main" xmlns:r="http://schemas.openxmlformats.org/officeDocument/2006/relationships" xmlns:p="http://schemas.openxmlformats.org/presentationml/2006/main">
+  <p:cSld>
+    <p:spTree>
+      <p:nvGrpSpPr>
+        <p:cNvPr id="1" name=""/>
+        <p:cNvGrpSpPr/>
+        <p:nvPr/>
+      </p:nvGrpSpPr>
+      <p:grpSpPr>
+        <a:xfrm>
+          <a:off x="0" y="0"/>
+          <a:ext cx="0" cy="0"/>
+          <a:chOff x="0" y="0"/>
+          <a:chExt cx="0" cy="0"/>
+        </a:xfrm>
+      </p:grpSpPr>
+      <p:sp>
+        <p:nvSpPr>
+          <p:cNvPr id="2" name="Title 1">
+            <a:extLst>
+              <a:ext uri="{FF2B5EF4-FFF2-40B4-BE49-F238E27FC236}">
+                <a16:creationId xmlns:a16="http://schemas.microsoft.com/office/drawing/2014/main" id="{96903D6B-2391-1374-8BCD-B396393E0D7A}"/>
+              </a:ext>
+            </a:extLst>
+          </p:cNvPr>
+          <p:cNvSpPr>
+            <a:spLocks noGrp="1"/>
+          </p:cNvSpPr>
+          <p:nvPr>
+            <p:ph type="title"/>
+          </p:nvPr>
+        </p:nvSpPr>
+        <p:spPr/>
+        <p:txBody>
+          <a:bodyPr/>
+          <a:lstStyle/>
+          <a:p>
+            <a:endParaRPr lang="en-US"/>
+          </a:p>
+        </p:txBody>
+      </p:sp>
+      <p:sp>
+        <p:nvSpPr>
+          <p:cNvPr id="3" name="Content Placeholder 2">
+            <a:extLst>
+              <a:ext uri="{FF2B5EF4-FFF2-40B4-BE49-F238E27FC236}">
+                <a16:creationId xmlns:a16="http://schemas.microsoft.com/office/drawing/2014/main" id="{689F8FEC-8F89-3413-BF78-81629C784694}"/>
+              </a:ext>
+            </a:extLst>
+          </p:cNvPr>
+          <p:cNvSpPr>
+            <a:spLocks noGrp="1"/>
+          </p:cNvSpPr>
+          <p:nvPr>
+            <p:ph idx="1"/>
+          </p:nvPr>
+        </p:nvSpPr>
+        <p:spPr/>
+        <p:txBody>
+          <a:bodyPr/>
+          <a:lstStyle/>
+          <a:p>
+            <a:endParaRPr lang="en-US"/>
+          </a:p>
+        </p:txBody>
+      </p:sp>
+    </p:spTree>
+    <p:extLst>
+      <p:ext uri="{BB962C8B-B14F-4D97-AF65-F5344CB8AC3E}">
+        <p14:creationId xmlns:p14="http://schemas.microsoft.com/office/powerpoint/2010/main" val="3381662323"/>
       </p:ext>
     </p:extLst>
   </p:cSld>

</xml_diff>